<commit_message>
IKT projekt feladat e'kezdése
</commit_message>
<xml_diff>
--- a/IKT Projekt feladat.pptx
+++ b/IKT Projekt feladat.pptx
@@ -5,11 +5,19 @@
     <p:sldMasterId id="2147483648" r:id="rId1"/>
   </p:sldMasterIdLst>
   <p:notesMasterIdLst>
-    <p:notesMasterId r:id="rId4"/>
+    <p:notesMasterId r:id="rId12"/>
   </p:notesMasterIdLst>
   <p:sldIdLst>
     <p:sldId id="256" r:id="rId2"/>
     <p:sldId id="257" r:id="rId3"/>
+    <p:sldId id="260" r:id="rId4"/>
+    <p:sldId id="261" r:id="rId5"/>
+    <p:sldId id="262" r:id="rId6"/>
+    <p:sldId id="263" r:id="rId7"/>
+    <p:sldId id="258" r:id="rId8"/>
+    <p:sldId id="259" r:id="rId9"/>
+    <p:sldId id="264" r:id="rId10"/>
+    <p:sldId id="265" r:id="rId11"/>
   </p:sldIdLst>
   <p:sldSz cx="12192000" cy="6858000"/>
   <p:notesSz cx="6858000" cy="9144000"/>
@@ -108,6 +116,11 @@
       </a:defRPr>
     </a:lvl9pPr>
   </p:defaultTextStyle>
+  <p:extLst>
+    <p:ext uri="{EFAFB233-063F-42B5-8137-9DF3F51BA10A}">
+      <p15:sldGuideLst xmlns:p15="http://schemas.microsoft.com/office/powerpoint/2012/main"/>
+    </p:ext>
+  </p:extLst>
 </p:presentation>
 </file>
 
@@ -193,7 +206,7 @@
           <a:p>
             <a:fld id="{47028C79-CE99-4F5E-B915-9B4C86903075}" type="datetimeFigureOut">
               <a:rPr lang="hu-HU" smtClean="0"/>
-              <a:t>2022.09.14.</a:t>
+              <a:t>2022.09.15.</a:t>
             </a:fld>
             <a:endParaRPr lang="hu-HU"/>
           </a:p>
@@ -676,7 +689,7 @@
           <a:p>
             <a:fld id="{8A946B64-D034-4954-AA20-D2A99A6A760F}" type="datetimeFigureOut">
               <a:rPr lang="hu-HU" smtClean="0"/>
-              <a:t>2022.09.14.</a:t>
+              <a:t>2022.09.15.</a:t>
             </a:fld>
             <a:endParaRPr lang="hu-HU"/>
           </a:p>
@@ -846,7 +859,7 @@
           <a:p>
             <a:fld id="{8A946B64-D034-4954-AA20-D2A99A6A760F}" type="datetimeFigureOut">
               <a:rPr lang="hu-HU" smtClean="0"/>
-              <a:t>2022.09.14.</a:t>
+              <a:t>2022.09.15.</a:t>
             </a:fld>
             <a:endParaRPr lang="hu-HU"/>
           </a:p>
@@ -1026,7 +1039,7 @@
           <a:p>
             <a:fld id="{8A946B64-D034-4954-AA20-D2A99A6A760F}" type="datetimeFigureOut">
               <a:rPr lang="hu-HU" smtClean="0"/>
-              <a:t>2022.09.14.</a:t>
+              <a:t>2022.09.15.</a:t>
             </a:fld>
             <a:endParaRPr lang="hu-HU"/>
           </a:p>
@@ -1196,7 +1209,7 @@
           <a:p>
             <a:fld id="{8A946B64-D034-4954-AA20-D2A99A6A760F}" type="datetimeFigureOut">
               <a:rPr lang="hu-HU" smtClean="0"/>
-              <a:t>2022.09.14.</a:t>
+              <a:t>2022.09.15.</a:t>
             </a:fld>
             <a:endParaRPr lang="hu-HU"/>
           </a:p>
@@ -1442,7 +1455,7 @@
           <a:p>
             <a:fld id="{8A946B64-D034-4954-AA20-D2A99A6A760F}" type="datetimeFigureOut">
               <a:rPr lang="hu-HU" smtClean="0"/>
-              <a:t>2022.09.14.</a:t>
+              <a:t>2022.09.15.</a:t>
             </a:fld>
             <a:endParaRPr lang="hu-HU"/>
           </a:p>
@@ -1674,7 +1687,7 @@
           <a:p>
             <a:fld id="{8A946B64-D034-4954-AA20-D2A99A6A760F}" type="datetimeFigureOut">
               <a:rPr lang="hu-HU" smtClean="0"/>
-              <a:t>2022.09.14.</a:t>
+              <a:t>2022.09.15.</a:t>
             </a:fld>
             <a:endParaRPr lang="hu-HU"/>
           </a:p>
@@ -2041,7 +2054,7 @@
           <a:p>
             <a:fld id="{8A946B64-D034-4954-AA20-D2A99A6A760F}" type="datetimeFigureOut">
               <a:rPr lang="hu-HU" smtClean="0"/>
-              <a:t>2022.09.14.</a:t>
+              <a:t>2022.09.15.</a:t>
             </a:fld>
             <a:endParaRPr lang="hu-HU"/>
           </a:p>
@@ -2159,7 +2172,7 @@
           <a:p>
             <a:fld id="{8A946B64-D034-4954-AA20-D2A99A6A760F}" type="datetimeFigureOut">
               <a:rPr lang="hu-HU" smtClean="0"/>
-              <a:t>2022.09.14.</a:t>
+              <a:t>2022.09.15.</a:t>
             </a:fld>
             <a:endParaRPr lang="hu-HU"/>
           </a:p>
@@ -2254,7 +2267,7 @@
           <a:p>
             <a:fld id="{8A946B64-D034-4954-AA20-D2A99A6A760F}" type="datetimeFigureOut">
               <a:rPr lang="hu-HU" smtClean="0"/>
-              <a:t>2022.09.14.</a:t>
+              <a:t>2022.09.15.</a:t>
             </a:fld>
             <a:endParaRPr lang="hu-HU"/>
           </a:p>
@@ -2531,7 +2544,7 @@
           <a:p>
             <a:fld id="{8A946B64-D034-4954-AA20-D2A99A6A760F}" type="datetimeFigureOut">
               <a:rPr lang="hu-HU" smtClean="0"/>
-              <a:t>2022.09.14.</a:t>
+              <a:t>2022.09.15.</a:t>
             </a:fld>
             <a:endParaRPr lang="hu-HU"/>
           </a:p>
@@ -2784,7 +2797,7 @@
           <a:p>
             <a:fld id="{8A946B64-D034-4954-AA20-D2A99A6A760F}" type="datetimeFigureOut">
               <a:rPr lang="hu-HU" smtClean="0"/>
-              <a:t>2022.09.14.</a:t>
+              <a:t>2022.09.15.</a:t>
             </a:fld>
             <a:endParaRPr lang="hu-HU"/>
           </a:p>
@@ -2997,7 +3010,7 @@
           <a:p>
             <a:fld id="{8A946B64-D034-4954-AA20-D2A99A6A760F}" type="datetimeFigureOut">
               <a:rPr lang="hu-HU" smtClean="0"/>
-              <a:t>2022.09.14.</a:t>
+              <a:t>2022.09.15.</a:t>
             </a:fld>
             <a:endParaRPr lang="hu-HU"/>
           </a:p>
@@ -3414,19 +3427,30 @@
         </p:nvSpPr>
         <p:spPr>
           <a:xfrm>
-            <a:off x="163551" y="382142"/>
-            <a:ext cx="6627542" cy="934031"/>
+            <a:off x="1060367" y="2263696"/>
+            <a:ext cx="10167410" cy="2167627"/>
           </a:xfrm>
         </p:spPr>
         <p:txBody>
-          <a:bodyPr/>
-          <a:lstStyle/>
-          <a:p>
-            <a:r>
-              <a:rPr lang="hu-HU" dirty="0" smtClean="0"/>
-              <a:t>HTML alapismeretek</a:t>
-            </a:r>
-            <a:endParaRPr lang="hu-HU" dirty="0"/>
+          <a:bodyPr>
+            <a:noAutofit/>
+          </a:bodyPr>
+          <a:lstStyle/>
+          <a:p>
+            <a:pPr>
+              <a:lnSpc>
+                <a:spcPct val="300000"/>
+              </a:lnSpc>
+            </a:pPr>
+            <a:r>
+              <a:rPr lang="hu-HU" sz="9600" dirty="0" err="1" smtClean="0"/>
+              <a:t>Scrum</a:t>
+            </a:r>
+            <a:r>
+              <a:rPr lang="hu-HU" sz="9600" dirty="0" smtClean="0"/>
+              <a:t> bemutatása</a:t>
+            </a:r>
+            <a:endParaRPr lang="hu-HU" sz="9600" dirty="0"/>
           </a:p>
         </p:txBody>
       </p:sp>
@@ -3454,7 +3478,7 @@
           <a:p>
             <a:r>
               <a:rPr lang="hu-HU" sz="4400" dirty="0" smtClean="0"/>
-              <a:t>Üdvözlök mindenkit!</a:t>
+              <a:t>Szevasztok Barik!</a:t>
             </a:r>
             <a:endParaRPr lang="hu-HU" sz="4400" dirty="0"/>
           </a:p>
@@ -3494,6 +3518,191 @@
     <p:extLst>
       <p:ext uri="{BB962C8B-B14F-4D97-AF65-F5344CB8AC3E}">
         <p14:creationId xmlns:p14="http://schemas.microsoft.com/office/powerpoint/2010/main" val="2388926748"/>
+      </p:ext>
+    </p:extLst>
+  </p:cSld>
+  <p:clrMapOvr>
+    <a:masterClrMapping/>
+  </p:clrMapOvr>
+</p:sld>
+</file>
+
+<file path=ppt/slides/slide10.xml><?xml version="1.0" encoding="utf-8"?>
+<p:sld xmlns:a="http://schemas.openxmlformats.org/drawingml/2006/main" xmlns:r="http://schemas.openxmlformats.org/officeDocument/2006/relationships" xmlns:p="http://schemas.openxmlformats.org/presentationml/2006/main">
+  <p:cSld>
+    <p:spTree>
+      <p:nvGrpSpPr>
+        <p:cNvPr id="1" name=""/>
+        <p:cNvGrpSpPr/>
+        <p:nvPr/>
+      </p:nvGrpSpPr>
+      <p:grpSpPr>
+        <a:xfrm>
+          <a:off x="0" y="0"/>
+          <a:ext cx="0" cy="0"/>
+          <a:chOff x="0" y="0"/>
+          <a:chExt cx="0" cy="0"/>
+        </a:xfrm>
+      </p:grpSpPr>
+      <p:sp>
+        <p:nvSpPr>
+          <p:cNvPr id="2" name="Cím 1"/>
+          <p:cNvSpPr>
+            <a:spLocks noGrp="1"/>
+          </p:cNvSpPr>
+          <p:nvPr>
+            <p:ph type="ctrTitle"/>
+          </p:nvPr>
+        </p:nvSpPr>
+        <p:spPr>
+          <a:xfrm>
+            <a:off x="0" y="1600201"/>
+            <a:ext cx="7095392" cy="3464169"/>
+          </a:xfrm>
+        </p:spPr>
+        <p:txBody>
+          <a:bodyPr>
+            <a:normAutofit/>
+          </a:bodyPr>
+          <a:lstStyle/>
+          <a:p>
+            <a:r>
+              <a:rPr lang="hu-HU" dirty="0" smtClean="0"/>
+              <a:t>Kösz mán, hogy végig nézted bástya! Legye’ szé</a:t>
+            </a:r>
+            <a:r>
+              <a:rPr lang="hu-HU" dirty="0"/>
+              <a:t>p</a:t>
+            </a:r>
+            <a:r>
+              <a:rPr lang="hu-HU" dirty="0" smtClean="0"/>
+              <a:t> </a:t>
+            </a:r>
+            <a:r>
+              <a:rPr lang="hu-HU" dirty="0" err="1" smtClean="0"/>
+              <a:t>napeszod</a:t>
+            </a:r>
+            <a:r>
+              <a:rPr lang="hu-HU" dirty="0" smtClean="0"/>
+              <a:t> </a:t>
+            </a:r>
+            <a:r>
+              <a:rPr lang="hu-HU" dirty="0" err="1" smtClean="0"/>
+              <a:t>bareszom</a:t>
+            </a:r>
+            <a:r>
+              <a:rPr lang="hu-HU" dirty="0"/>
+              <a:t>!</a:t>
+            </a:r>
+          </a:p>
+        </p:txBody>
+      </p:sp>
+      <p:sp>
+        <p:nvSpPr>
+          <p:cNvPr id="3" name="Alcím 2"/>
+          <p:cNvSpPr>
+            <a:spLocks noGrp="1"/>
+          </p:cNvSpPr>
+          <p:nvPr>
+            <p:ph type="subTitle" idx="1"/>
+          </p:nvPr>
+        </p:nvSpPr>
+        <p:spPr>
+          <a:xfrm>
+            <a:off x="-835269" y="0"/>
+            <a:ext cx="2971800" cy="650631"/>
+          </a:xfrm>
+        </p:spPr>
+        <p:txBody>
+          <a:bodyPr>
+            <a:normAutofit/>
+          </a:bodyPr>
+          <a:lstStyle/>
+          <a:p>
+            <a:r>
+              <a:rPr lang="hu-HU" sz="1050" dirty="0" err="1" smtClean="0"/>
+              <a:t>Puszcsi</a:t>
+            </a:r>
+            <a:r>
+              <a:rPr lang="hu-HU" sz="1050" dirty="0" smtClean="0"/>
+              <a:t> a </a:t>
+            </a:r>
+            <a:r>
+              <a:rPr lang="hu-HU" sz="1050" dirty="0" err="1" smtClean="0"/>
+              <a:t>poszcsitokra</a:t>
+            </a:r>
+            <a:r>
+              <a:rPr lang="hu-HU" sz="1050" dirty="0" smtClean="0"/>
+              <a:t>!</a:t>
+            </a:r>
+            <a:endParaRPr lang="hu-HU" sz="1050" dirty="0"/>
+          </a:p>
+        </p:txBody>
+      </p:sp>
+      <p:pic>
+        <p:nvPicPr>
+          <p:cNvPr id="4" name="Kép 3"/>
+          <p:cNvPicPr>
+            <a:picLocks noChangeAspect="1"/>
+          </p:cNvPicPr>
+          <p:nvPr/>
+        </p:nvPicPr>
+        <p:blipFill>
+          <a:blip r:embed="rId2" cstate="print">
+            <a:extLst>
+              <a:ext uri="{28A0092B-C50C-407E-A947-70E740481C1C}">
+                <a14:useLocalDpi xmlns:a14="http://schemas.microsoft.com/office/drawing/2010/main" val="0"/>
+              </a:ext>
+            </a:extLst>
+          </a:blip>
+          <a:stretch>
+            <a:fillRect/>
+          </a:stretch>
+        </p:blipFill>
+        <p:spPr>
+          <a:xfrm>
+            <a:off x="1301262" y="18511"/>
+            <a:ext cx="180460" cy="174920"/>
+          </a:xfrm>
+          <a:prstGeom prst="rect">
+            <a:avLst/>
+          </a:prstGeom>
+        </p:spPr>
+      </p:pic>
+      <p:pic>
+        <p:nvPicPr>
+          <p:cNvPr id="5" name="Kép 4"/>
+          <p:cNvPicPr>
+            <a:picLocks noChangeAspect="1"/>
+          </p:cNvPicPr>
+          <p:nvPr/>
+        </p:nvPicPr>
+        <p:blipFill>
+          <a:blip r:embed="rId3">
+            <a:extLst>
+              <a:ext uri="{28A0092B-C50C-407E-A947-70E740481C1C}">
+                <a14:useLocalDpi xmlns:a14="http://schemas.microsoft.com/office/drawing/2010/main" val="0"/>
+              </a:ext>
+            </a:extLst>
+          </a:blip>
+          <a:stretch>
+            <a:fillRect/>
+          </a:stretch>
+        </p:blipFill>
+        <p:spPr>
+          <a:xfrm>
+            <a:off x="6822831" y="1497779"/>
+            <a:ext cx="5369169" cy="5360221"/>
+          </a:xfrm>
+          <a:prstGeom prst="rect">
+            <a:avLst/>
+          </a:prstGeom>
+        </p:spPr>
+      </p:pic>
+    </p:spTree>
+    <p:extLst>
+      <p:ext uri="{BB962C8B-B14F-4D97-AF65-F5344CB8AC3E}">
+        <p14:creationId xmlns:p14="http://schemas.microsoft.com/office/powerpoint/2010/main" val="4153753542"/>
       </p:ext>
     </p:extLst>
   </p:cSld>
@@ -3522,34 +3731,6 @@
       </p:grpSpPr>
       <p:sp>
         <p:nvSpPr>
-          <p:cNvPr id="2" name="Cím 1"/>
-          <p:cNvSpPr>
-            <a:spLocks noGrp="1"/>
-          </p:cNvSpPr>
-          <p:nvPr>
-            <p:ph type="title"/>
-          </p:nvPr>
-        </p:nvSpPr>
-        <p:spPr>
-          <a:xfrm>
-            <a:off x="0" y="5747175"/>
-            <a:ext cx="4090639" cy="1110825"/>
-          </a:xfrm>
-        </p:spPr>
-        <p:txBody>
-          <a:bodyPr/>
-          <a:lstStyle/>
-          <a:p>
-            <a:r>
-              <a:rPr lang="hu-HU" dirty="0" smtClean="0"/>
-              <a:t>Mi is az a HTML?</a:t>
-            </a:r>
-            <a:endParaRPr lang="hu-HU" dirty="0"/>
-          </a:p>
-        </p:txBody>
-      </p:sp>
-      <p:sp>
-        <p:nvSpPr>
           <p:cNvPr id="3" name="Tartalom helye 2"/>
           <p:cNvSpPr>
             <a:spLocks noGrp="1"/>
@@ -3568,17 +3749,972 @@
           <a:bodyPr/>
           <a:lstStyle/>
           <a:p>
-            <a:pPr marL="0" indent="0">
-              <a:buNone/>
-            </a:pPr>
+            <a:r>
+              <a:rPr lang="hu-HU" dirty="0" smtClean="0"/>
+              <a:t>Terméktulajdonos</a:t>
+            </a:r>
+            <a:r>
+              <a:rPr lang="hu-HU" dirty="0"/>
+              <a:t> </a:t>
+            </a:r>
             <a:endParaRPr lang="hu-HU" dirty="0" smtClean="0"/>
           </a:p>
-        </p:txBody>
-      </p:sp>
+          <a:p>
+            <a:pPr lvl="1"/>
+            <a:r>
+              <a:rPr lang="hu-HU" dirty="0" err="1" smtClean="0"/>
+              <a:t>Product</a:t>
+            </a:r>
+            <a:r>
+              <a:rPr lang="hu-HU" dirty="0" smtClean="0"/>
+              <a:t> </a:t>
+            </a:r>
+            <a:r>
+              <a:rPr lang="hu-HU" dirty="0" err="1" smtClean="0"/>
+              <a:t>Owner</a:t>
+            </a:r>
+            <a:endParaRPr lang="hu-HU" dirty="0" smtClean="0"/>
+          </a:p>
+          <a:p>
+            <a:r>
+              <a:rPr lang="hu-HU" dirty="0" smtClean="0"/>
+              <a:t>Fejlesztők</a:t>
+            </a:r>
+          </a:p>
+          <a:p>
+            <a:pPr lvl="1"/>
+            <a:r>
+              <a:rPr lang="hu-HU" dirty="0" err="1" smtClean="0"/>
+              <a:t>Developers</a:t>
+            </a:r>
+            <a:endParaRPr lang="hu-HU" dirty="0"/>
+          </a:p>
+          <a:p>
+            <a:r>
+              <a:rPr lang="hu-HU" dirty="0" err="1" smtClean="0"/>
+              <a:t>Scrum</a:t>
+            </a:r>
+            <a:r>
+              <a:rPr lang="hu-HU" dirty="0" smtClean="0"/>
+              <a:t> Mester</a:t>
+            </a:r>
+          </a:p>
+          <a:p>
+            <a:r>
+              <a:rPr lang="hu-HU" dirty="0" smtClean="0"/>
+              <a:t>Más érintettek</a:t>
+            </a:r>
+          </a:p>
+          <a:p>
+            <a:pPr lvl="1"/>
+            <a:r>
+              <a:rPr lang="hu-HU" dirty="0" smtClean="0"/>
+              <a:t>Felhasználók</a:t>
+            </a:r>
+          </a:p>
+          <a:p>
+            <a:pPr lvl="1"/>
+            <a:r>
+              <a:rPr lang="hu-HU" dirty="0" smtClean="0"/>
+              <a:t>Menedzserek és üzleti szereplők</a:t>
+            </a:r>
+            <a:endParaRPr lang="hu-HU" dirty="0" smtClean="0"/>
+          </a:p>
+          <a:p>
+            <a:pPr lvl="1"/>
+            <a:endParaRPr lang="hu-HU" dirty="0"/>
+          </a:p>
+        </p:txBody>
+      </p:sp>
+      <p:sp>
+        <p:nvSpPr>
+          <p:cNvPr id="4" name="Cím 3"/>
+          <p:cNvSpPr>
+            <a:spLocks noGrp="1"/>
+          </p:cNvSpPr>
+          <p:nvPr>
+            <p:ph type="title"/>
+          </p:nvPr>
+        </p:nvSpPr>
+        <p:spPr>
+          <a:xfrm>
+            <a:off x="0" y="5782774"/>
+            <a:ext cx="3522785" cy="1075226"/>
+          </a:xfrm>
+        </p:spPr>
+        <p:txBody>
+          <a:bodyPr/>
+          <a:lstStyle/>
+          <a:p>
+            <a:r>
+              <a:rPr lang="hu-HU" dirty="0" err="1" smtClean="0"/>
+              <a:t>Scrum</a:t>
+            </a:r>
+            <a:r>
+              <a:rPr lang="hu-HU" dirty="0" smtClean="0"/>
+              <a:t> Csapat</a:t>
+            </a:r>
+            <a:endParaRPr lang="hu-HU" dirty="0"/>
+          </a:p>
+        </p:txBody>
+      </p:sp>
+      <p:pic>
+        <p:nvPicPr>
+          <p:cNvPr id="5" name="Kép 4"/>
+          <p:cNvPicPr>
+            <a:picLocks noChangeAspect="1"/>
+          </p:cNvPicPr>
+          <p:nvPr/>
+        </p:nvPicPr>
+        <p:blipFill>
+          <a:blip r:embed="rId3" cstate="print">
+            <a:extLst>
+              <a:ext uri="{28A0092B-C50C-407E-A947-70E740481C1C}">
+                <a14:useLocalDpi xmlns:a14="http://schemas.microsoft.com/office/drawing/2010/main" val="0"/>
+              </a:ext>
+            </a:extLst>
+          </a:blip>
+          <a:stretch>
+            <a:fillRect/>
+          </a:stretch>
+        </p:blipFill>
+        <p:spPr>
+          <a:xfrm>
+            <a:off x="307731" y="157343"/>
+            <a:ext cx="4984533" cy="3025472"/>
+          </a:xfrm>
+          <a:prstGeom prst="rect">
+            <a:avLst/>
+          </a:prstGeom>
+        </p:spPr>
+      </p:pic>
+      <p:pic>
+        <p:nvPicPr>
+          <p:cNvPr id="6" name="Kép 5"/>
+          <p:cNvPicPr>
+            <a:picLocks noChangeAspect="1"/>
+          </p:cNvPicPr>
+          <p:nvPr/>
+        </p:nvPicPr>
+        <p:blipFill>
+          <a:blip r:embed="rId4">
+            <a:extLst>
+              <a:ext uri="{28A0092B-C50C-407E-A947-70E740481C1C}">
+                <a14:useLocalDpi xmlns:a14="http://schemas.microsoft.com/office/drawing/2010/main" val="0"/>
+              </a:ext>
+            </a:extLst>
+          </a:blip>
+          <a:stretch>
+            <a:fillRect/>
+          </a:stretch>
+        </p:blipFill>
+        <p:spPr>
+          <a:xfrm>
+            <a:off x="0" y="3567019"/>
+            <a:ext cx="5833199" cy="1757729"/>
+          </a:xfrm>
+          <a:prstGeom prst="rect">
+            <a:avLst/>
+          </a:prstGeom>
+        </p:spPr>
+      </p:pic>
     </p:spTree>
     <p:extLst>
       <p:ext uri="{BB962C8B-B14F-4D97-AF65-F5344CB8AC3E}">
         <p14:creationId xmlns:p14="http://schemas.microsoft.com/office/powerpoint/2010/main" val="3640868098"/>
+      </p:ext>
+    </p:extLst>
+  </p:cSld>
+  <p:clrMapOvr>
+    <a:masterClrMapping/>
+  </p:clrMapOvr>
+</p:sld>
+</file>
+
+<file path=ppt/slides/slide3.xml><?xml version="1.0" encoding="utf-8"?>
+<p:sld xmlns:a="http://schemas.openxmlformats.org/drawingml/2006/main" xmlns:r="http://schemas.openxmlformats.org/officeDocument/2006/relationships" xmlns:p="http://schemas.openxmlformats.org/presentationml/2006/main">
+  <p:cSld>
+    <p:spTree>
+      <p:nvGrpSpPr>
+        <p:cNvPr id="1" name=""/>
+        <p:cNvGrpSpPr/>
+        <p:nvPr/>
+      </p:nvGrpSpPr>
+      <p:grpSpPr>
+        <a:xfrm>
+          <a:off x="0" y="0"/>
+          <a:ext cx="0" cy="0"/>
+          <a:chOff x="0" y="0"/>
+          <a:chExt cx="0" cy="0"/>
+        </a:xfrm>
+      </p:grpSpPr>
+      <p:sp>
+        <p:nvSpPr>
+          <p:cNvPr id="2" name="Cím 1"/>
+          <p:cNvSpPr>
+            <a:spLocks noGrp="1"/>
+          </p:cNvSpPr>
+          <p:nvPr>
+            <p:ph type="title"/>
+          </p:nvPr>
+        </p:nvSpPr>
+        <p:spPr/>
+        <p:txBody>
+          <a:bodyPr/>
+          <a:lstStyle/>
+          <a:p>
+            <a:r>
+              <a:rPr lang="hu-HU" dirty="0" smtClean="0"/>
+              <a:t>Terméktulajdonos feladata</a:t>
+            </a:r>
+            <a:endParaRPr lang="hu-HU" dirty="0"/>
+          </a:p>
+        </p:txBody>
+      </p:sp>
+      <p:pic>
+        <p:nvPicPr>
+          <p:cNvPr id="5" name="Tartalom helye 4"/>
+          <p:cNvPicPr>
+            <a:picLocks noGrp="1" noChangeAspect="1"/>
+          </p:cNvPicPr>
+          <p:nvPr>
+            <p:ph sz="half" idx="1"/>
+          </p:nvPr>
+        </p:nvPicPr>
+        <p:blipFill>
+          <a:blip r:embed="rId2">
+            <a:extLst>
+              <a:ext uri="{28A0092B-C50C-407E-A947-70E740481C1C}">
+                <a14:useLocalDpi xmlns:a14="http://schemas.microsoft.com/office/drawing/2010/main" val="0"/>
+              </a:ext>
+            </a:extLst>
+          </a:blip>
+          <a:stretch>
+            <a:fillRect/>
+          </a:stretch>
+        </p:blipFill>
+        <p:spPr>
+          <a:xfrm>
+            <a:off x="161192" y="2120063"/>
+            <a:ext cx="5820138" cy="3041022"/>
+          </a:xfrm>
+        </p:spPr>
+      </p:pic>
+      <p:sp>
+        <p:nvSpPr>
+          <p:cNvPr id="4" name="Tartalom helye 3"/>
+          <p:cNvSpPr>
+            <a:spLocks noGrp="1"/>
+          </p:cNvSpPr>
+          <p:nvPr>
+            <p:ph sz="half" idx="2"/>
+          </p:nvPr>
+        </p:nvSpPr>
+        <p:spPr/>
+        <p:txBody>
+          <a:bodyPr/>
+          <a:lstStyle/>
+          <a:p>
+            <a:endParaRPr lang="hu-HU"/>
+          </a:p>
+        </p:txBody>
+      </p:sp>
+    </p:spTree>
+    <p:extLst>
+      <p:ext uri="{BB962C8B-B14F-4D97-AF65-F5344CB8AC3E}">
+        <p14:creationId xmlns:p14="http://schemas.microsoft.com/office/powerpoint/2010/main" val="1117580574"/>
+      </p:ext>
+    </p:extLst>
+  </p:cSld>
+  <p:clrMapOvr>
+    <a:masterClrMapping/>
+  </p:clrMapOvr>
+</p:sld>
+</file>
+
+<file path=ppt/slides/slide4.xml><?xml version="1.0" encoding="utf-8"?>
+<p:sld xmlns:a="http://schemas.openxmlformats.org/drawingml/2006/main" xmlns:r="http://schemas.openxmlformats.org/officeDocument/2006/relationships" xmlns:p="http://schemas.openxmlformats.org/presentationml/2006/main">
+  <p:cSld>
+    <p:spTree>
+      <p:nvGrpSpPr>
+        <p:cNvPr id="1" name=""/>
+        <p:cNvGrpSpPr/>
+        <p:nvPr/>
+      </p:nvGrpSpPr>
+      <p:grpSpPr>
+        <a:xfrm>
+          <a:off x="0" y="0"/>
+          <a:ext cx="0" cy="0"/>
+          <a:chOff x="0" y="0"/>
+          <a:chExt cx="0" cy="0"/>
+        </a:xfrm>
+      </p:grpSpPr>
+      <p:sp>
+        <p:nvSpPr>
+          <p:cNvPr id="2" name="Cím 1"/>
+          <p:cNvSpPr>
+            <a:spLocks noGrp="1"/>
+          </p:cNvSpPr>
+          <p:nvPr>
+            <p:ph type="title"/>
+          </p:nvPr>
+        </p:nvSpPr>
+        <p:spPr/>
+        <p:txBody>
+          <a:bodyPr/>
+          <a:lstStyle/>
+          <a:p>
+            <a:r>
+              <a:rPr lang="hu-HU" dirty="0" err="1" smtClean="0"/>
+              <a:t>Scrum</a:t>
+            </a:r>
+            <a:r>
+              <a:rPr lang="hu-HU" dirty="0" smtClean="0"/>
+              <a:t> Mester feladata</a:t>
+            </a:r>
+            <a:endParaRPr lang="hu-HU" dirty="0"/>
+          </a:p>
+        </p:txBody>
+      </p:sp>
+      <p:pic>
+        <p:nvPicPr>
+          <p:cNvPr id="5" name="Tartalom helye 4"/>
+          <p:cNvPicPr>
+            <a:picLocks noGrp="1" noChangeAspect="1"/>
+          </p:cNvPicPr>
+          <p:nvPr>
+            <p:ph sz="half" idx="1"/>
+          </p:nvPr>
+        </p:nvPicPr>
+        <p:blipFill>
+          <a:blip r:embed="rId2" cstate="print">
+            <a:extLst>
+              <a:ext uri="{28A0092B-C50C-407E-A947-70E740481C1C}">
+                <a14:useLocalDpi xmlns:a14="http://schemas.microsoft.com/office/drawing/2010/main" val="0"/>
+              </a:ext>
+            </a:extLst>
+          </a:blip>
+          <a:stretch>
+            <a:fillRect/>
+          </a:stretch>
+        </p:blipFill>
+        <p:spPr>
+          <a:xfrm>
+            <a:off x="284285" y="2104353"/>
+            <a:ext cx="5621758" cy="3162239"/>
+          </a:xfrm>
+        </p:spPr>
+      </p:pic>
+      <p:sp>
+        <p:nvSpPr>
+          <p:cNvPr id="4" name="Tartalom helye 3"/>
+          <p:cNvSpPr>
+            <a:spLocks noGrp="1"/>
+          </p:cNvSpPr>
+          <p:nvPr>
+            <p:ph sz="half" idx="2"/>
+          </p:nvPr>
+        </p:nvSpPr>
+        <p:spPr/>
+        <p:txBody>
+          <a:bodyPr/>
+          <a:lstStyle/>
+          <a:p>
+            <a:endParaRPr lang="hu-HU"/>
+          </a:p>
+        </p:txBody>
+      </p:sp>
+    </p:spTree>
+    <p:extLst>
+      <p:ext uri="{BB962C8B-B14F-4D97-AF65-F5344CB8AC3E}">
+        <p14:creationId xmlns:p14="http://schemas.microsoft.com/office/powerpoint/2010/main" val="1100010835"/>
+      </p:ext>
+    </p:extLst>
+  </p:cSld>
+  <p:clrMapOvr>
+    <a:masterClrMapping/>
+  </p:clrMapOvr>
+</p:sld>
+</file>
+
+<file path=ppt/slides/slide5.xml><?xml version="1.0" encoding="utf-8"?>
+<p:sld xmlns:a="http://schemas.openxmlformats.org/drawingml/2006/main" xmlns:r="http://schemas.openxmlformats.org/officeDocument/2006/relationships" xmlns:p="http://schemas.openxmlformats.org/presentationml/2006/main">
+  <p:cSld>
+    <p:spTree>
+      <p:nvGrpSpPr>
+        <p:cNvPr id="1" name=""/>
+        <p:cNvGrpSpPr/>
+        <p:nvPr/>
+      </p:nvGrpSpPr>
+      <p:grpSpPr>
+        <a:xfrm>
+          <a:off x="0" y="0"/>
+          <a:ext cx="0" cy="0"/>
+          <a:chOff x="0" y="0"/>
+          <a:chExt cx="0" cy="0"/>
+        </a:xfrm>
+      </p:grpSpPr>
+      <p:sp>
+        <p:nvSpPr>
+          <p:cNvPr id="2" name="Cím 1"/>
+          <p:cNvSpPr>
+            <a:spLocks noGrp="1"/>
+          </p:cNvSpPr>
+          <p:nvPr>
+            <p:ph type="title"/>
+          </p:nvPr>
+        </p:nvSpPr>
+        <p:spPr/>
+        <p:txBody>
+          <a:bodyPr/>
+          <a:lstStyle/>
+          <a:p>
+            <a:r>
+              <a:rPr lang="hu-HU" dirty="0" smtClean="0"/>
+              <a:t>Fejlesztők feladata</a:t>
+            </a:r>
+            <a:endParaRPr lang="hu-HU" dirty="0"/>
+          </a:p>
+        </p:txBody>
+      </p:sp>
+      <p:sp>
+        <p:nvSpPr>
+          <p:cNvPr id="4" name="Tartalom helye 3"/>
+          <p:cNvSpPr>
+            <a:spLocks noGrp="1"/>
+          </p:cNvSpPr>
+          <p:nvPr>
+            <p:ph sz="half" idx="2"/>
+          </p:nvPr>
+        </p:nvSpPr>
+        <p:spPr/>
+        <p:txBody>
+          <a:bodyPr/>
+          <a:lstStyle/>
+          <a:p>
+            <a:endParaRPr lang="hu-HU"/>
+          </a:p>
+        </p:txBody>
+      </p:sp>
+      <p:pic>
+        <p:nvPicPr>
+          <p:cNvPr id="7" name="Tartalom helye 6"/>
+          <p:cNvPicPr>
+            <a:picLocks noGrp="1" noChangeAspect="1"/>
+          </p:cNvPicPr>
+          <p:nvPr>
+            <p:ph sz="half" idx="1"/>
+          </p:nvPr>
+        </p:nvPicPr>
+        <p:blipFill>
+          <a:blip r:embed="rId2">
+            <a:extLst>
+              <a:ext uri="{28A0092B-C50C-407E-A947-70E740481C1C}">
+                <a14:useLocalDpi xmlns:a14="http://schemas.microsoft.com/office/drawing/2010/main" val="0"/>
+              </a:ext>
+            </a:extLst>
+          </a:blip>
+          <a:stretch>
+            <a:fillRect/>
+          </a:stretch>
+        </p:blipFill>
+        <p:spPr>
+          <a:xfrm>
+            <a:off x="127245" y="2274032"/>
+            <a:ext cx="5880832" cy="2968902"/>
+          </a:xfrm>
+        </p:spPr>
+      </p:pic>
+    </p:spTree>
+    <p:extLst>
+      <p:ext uri="{BB962C8B-B14F-4D97-AF65-F5344CB8AC3E}">
+        <p14:creationId xmlns:p14="http://schemas.microsoft.com/office/powerpoint/2010/main" val="3266299040"/>
+      </p:ext>
+    </p:extLst>
+  </p:cSld>
+  <p:clrMapOvr>
+    <a:masterClrMapping/>
+  </p:clrMapOvr>
+</p:sld>
+</file>
+
+<file path=ppt/slides/slide6.xml><?xml version="1.0" encoding="utf-8"?>
+<p:sld xmlns:a="http://schemas.openxmlformats.org/drawingml/2006/main" xmlns:r="http://schemas.openxmlformats.org/officeDocument/2006/relationships" xmlns:p="http://schemas.openxmlformats.org/presentationml/2006/main">
+  <p:cSld>
+    <p:spTree>
+      <p:nvGrpSpPr>
+        <p:cNvPr id="1" name=""/>
+        <p:cNvGrpSpPr/>
+        <p:nvPr/>
+      </p:nvGrpSpPr>
+      <p:grpSpPr>
+        <a:xfrm>
+          <a:off x="0" y="0"/>
+          <a:ext cx="0" cy="0"/>
+          <a:chOff x="0" y="0"/>
+          <a:chExt cx="0" cy="0"/>
+        </a:xfrm>
+      </p:grpSpPr>
+      <p:sp>
+        <p:nvSpPr>
+          <p:cNvPr id="2" name="Cím 1"/>
+          <p:cNvSpPr>
+            <a:spLocks noGrp="1"/>
+          </p:cNvSpPr>
+          <p:nvPr>
+            <p:ph type="title"/>
+          </p:nvPr>
+        </p:nvSpPr>
+        <p:spPr>
+          <a:xfrm>
+            <a:off x="0" y="5501420"/>
+            <a:ext cx="4806462" cy="1356580"/>
+          </a:xfrm>
+        </p:spPr>
+        <p:txBody>
+          <a:bodyPr>
+            <a:normAutofit fontScale="90000"/>
+          </a:bodyPr>
+          <a:lstStyle/>
+          <a:p>
+            <a:r>
+              <a:rPr lang="hu-HU" dirty="0" smtClean="0"/>
+              <a:t>Egyéb érintett szereplők bemutatása</a:t>
+            </a:r>
+            <a:endParaRPr lang="hu-HU" dirty="0"/>
+          </a:p>
+        </p:txBody>
+      </p:sp>
+      <p:pic>
+        <p:nvPicPr>
+          <p:cNvPr id="5" name="Tartalom helye 4"/>
+          <p:cNvPicPr>
+            <a:picLocks noGrp="1" noChangeAspect="1"/>
+          </p:cNvPicPr>
+          <p:nvPr>
+            <p:ph sz="half" idx="2"/>
+          </p:nvPr>
+        </p:nvPicPr>
+        <p:blipFill>
+          <a:blip r:embed="rId2">
+            <a:extLst>
+              <a:ext uri="{28A0092B-C50C-407E-A947-70E740481C1C}">
+                <a14:useLocalDpi xmlns:a14="http://schemas.microsoft.com/office/drawing/2010/main" val="0"/>
+              </a:ext>
+            </a:extLst>
+          </a:blip>
+          <a:stretch>
+            <a:fillRect/>
+          </a:stretch>
+        </p:blipFill>
+        <p:spPr>
+          <a:xfrm>
+            <a:off x="0" y="0"/>
+            <a:ext cx="2646424" cy="2646424"/>
+          </a:xfrm>
+        </p:spPr>
+      </p:pic>
+      <p:pic>
+        <p:nvPicPr>
+          <p:cNvPr id="6" name="Kép 5"/>
+          <p:cNvPicPr>
+            <a:picLocks noChangeAspect="1"/>
+          </p:cNvPicPr>
+          <p:nvPr/>
+        </p:nvPicPr>
+        <p:blipFill>
+          <a:blip r:embed="rId3">
+            <a:extLst>
+              <a:ext uri="{28A0092B-C50C-407E-A947-70E740481C1C}">
+                <a14:useLocalDpi xmlns:a14="http://schemas.microsoft.com/office/drawing/2010/main" val="0"/>
+              </a:ext>
+            </a:extLst>
+          </a:blip>
+          <a:stretch>
+            <a:fillRect/>
+          </a:stretch>
+        </p:blipFill>
+        <p:spPr>
+          <a:xfrm>
+            <a:off x="0" y="2646424"/>
+            <a:ext cx="1676400" cy="2733675"/>
+          </a:xfrm>
+          <a:prstGeom prst="rect">
+            <a:avLst/>
+          </a:prstGeom>
+        </p:spPr>
+      </p:pic>
+      <p:pic>
+        <p:nvPicPr>
+          <p:cNvPr id="7" name="Kép 6"/>
+          <p:cNvPicPr>
+            <a:picLocks noChangeAspect="1"/>
+          </p:cNvPicPr>
+          <p:nvPr/>
+        </p:nvPicPr>
+        <p:blipFill>
+          <a:blip r:embed="rId4" cstate="print">
+            <a:extLst>
+              <a:ext uri="{28A0092B-C50C-407E-A947-70E740481C1C}">
+                <a14:useLocalDpi xmlns:a14="http://schemas.microsoft.com/office/drawing/2010/main" val="0"/>
+              </a:ext>
+            </a:extLst>
+          </a:blip>
+          <a:stretch>
+            <a:fillRect/>
+          </a:stretch>
+        </p:blipFill>
+        <p:spPr>
+          <a:xfrm>
+            <a:off x="2646424" y="0"/>
+            <a:ext cx="1900969" cy="1900969"/>
+          </a:xfrm>
+          <a:prstGeom prst="rect">
+            <a:avLst/>
+          </a:prstGeom>
+        </p:spPr>
+      </p:pic>
+    </p:spTree>
+    <p:extLst>
+      <p:ext uri="{BB962C8B-B14F-4D97-AF65-F5344CB8AC3E}">
+        <p14:creationId xmlns:p14="http://schemas.microsoft.com/office/powerpoint/2010/main" val="1031953159"/>
+      </p:ext>
+    </p:extLst>
+  </p:cSld>
+  <p:clrMapOvr>
+    <a:masterClrMapping/>
+  </p:clrMapOvr>
+</p:sld>
+</file>
+
+<file path=ppt/slides/slide7.xml><?xml version="1.0" encoding="utf-8"?>
+<p:sld xmlns:a="http://schemas.openxmlformats.org/drawingml/2006/main" xmlns:r="http://schemas.openxmlformats.org/officeDocument/2006/relationships" xmlns:p="http://schemas.openxmlformats.org/presentationml/2006/main">
+  <p:cSld>
+    <p:spTree>
+      <p:nvGrpSpPr>
+        <p:cNvPr id="1" name=""/>
+        <p:cNvGrpSpPr/>
+        <p:nvPr/>
+      </p:nvGrpSpPr>
+      <p:grpSpPr>
+        <a:xfrm>
+          <a:off x="0" y="0"/>
+          <a:ext cx="0" cy="0"/>
+          <a:chOff x="0" y="0"/>
+          <a:chExt cx="0" cy="0"/>
+        </a:xfrm>
+      </p:grpSpPr>
+      <p:sp>
+        <p:nvSpPr>
+          <p:cNvPr id="2" name="Cím 1"/>
+          <p:cNvSpPr>
+            <a:spLocks noGrp="1"/>
+          </p:cNvSpPr>
+          <p:nvPr>
+            <p:ph type="title"/>
+          </p:nvPr>
+        </p:nvSpPr>
+        <p:spPr>
+          <a:xfrm>
+            <a:off x="6849207" y="0"/>
+            <a:ext cx="5342793" cy="1325563"/>
+          </a:xfrm>
+        </p:spPr>
+        <p:txBody>
+          <a:bodyPr/>
+          <a:lstStyle/>
+          <a:p>
+            <a:r>
+              <a:rPr lang="hu-HU" dirty="0" err="1" smtClean="0"/>
+              <a:t>Scrum</a:t>
+            </a:r>
+            <a:r>
+              <a:rPr lang="hu-HU" dirty="0" smtClean="0"/>
+              <a:t> megbeszélések</a:t>
+            </a:r>
+            <a:endParaRPr lang="hu-HU" dirty="0"/>
+          </a:p>
+        </p:txBody>
+      </p:sp>
+      <p:sp>
+        <p:nvSpPr>
+          <p:cNvPr id="3" name="Tartalom helye 2"/>
+          <p:cNvSpPr>
+            <a:spLocks noGrp="1"/>
+          </p:cNvSpPr>
+          <p:nvPr>
+            <p:ph sz="half" idx="1"/>
+          </p:nvPr>
+        </p:nvSpPr>
+        <p:spPr>
+          <a:xfrm>
+            <a:off x="0" y="0"/>
+            <a:ext cx="5181600" cy="4351338"/>
+          </a:xfrm>
+        </p:spPr>
+        <p:txBody>
+          <a:bodyPr/>
+          <a:lstStyle/>
+          <a:p>
+            <a:r>
+              <a:rPr lang="hu-HU" dirty="0" smtClean="0"/>
+              <a:t>Sprint Tervezés (Sprint </a:t>
+            </a:r>
+            <a:r>
+              <a:rPr lang="hu-HU" dirty="0" err="1" smtClean="0"/>
+              <a:t>Planning</a:t>
+            </a:r>
+            <a:r>
+              <a:rPr lang="hu-HU" dirty="0" smtClean="0"/>
+              <a:t>)</a:t>
+            </a:r>
+          </a:p>
+          <a:p>
+            <a:r>
+              <a:rPr lang="hu-HU" dirty="0" smtClean="0"/>
+              <a:t>Napi </a:t>
+            </a:r>
+            <a:r>
+              <a:rPr lang="hu-HU" dirty="0" err="1" smtClean="0"/>
+              <a:t>Scrum</a:t>
+            </a:r>
+            <a:endParaRPr lang="hu-HU" dirty="0"/>
+          </a:p>
+          <a:p>
+            <a:pPr lvl="1"/>
+            <a:r>
+              <a:rPr lang="hu-HU" dirty="0" smtClean="0"/>
+              <a:t>Megbeszélés</a:t>
+            </a:r>
+          </a:p>
+          <a:p>
+            <a:r>
+              <a:rPr lang="hu-HU" dirty="0" smtClean="0"/>
+              <a:t>Sprint Áttekintés (Sprint </a:t>
+            </a:r>
+            <a:r>
+              <a:rPr lang="hu-HU" dirty="0" err="1" smtClean="0"/>
+              <a:t>Demo</a:t>
+            </a:r>
+            <a:r>
+              <a:rPr lang="hu-HU" dirty="0" smtClean="0"/>
+              <a:t>)</a:t>
+            </a:r>
+          </a:p>
+          <a:p>
+            <a:r>
+              <a:rPr lang="hu-HU" dirty="0" smtClean="0"/>
+              <a:t>Sprint </a:t>
+            </a:r>
+            <a:r>
+              <a:rPr lang="hu-HU" dirty="0" err="1" smtClean="0"/>
+              <a:t>Visszatekintás</a:t>
+            </a:r>
+            <a:r>
+              <a:rPr lang="hu-HU" dirty="0" smtClean="0"/>
+              <a:t> (Sprint </a:t>
+            </a:r>
+            <a:r>
+              <a:rPr lang="hu-HU" dirty="0" err="1" smtClean="0"/>
+              <a:t>Retospektív</a:t>
+            </a:r>
+            <a:r>
+              <a:rPr lang="hu-HU" dirty="0" smtClean="0"/>
+              <a:t>)</a:t>
+            </a:r>
+          </a:p>
+        </p:txBody>
+      </p:sp>
+    </p:spTree>
+    <p:extLst>
+      <p:ext uri="{BB962C8B-B14F-4D97-AF65-F5344CB8AC3E}">
+        <p14:creationId xmlns:p14="http://schemas.microsoft.com/office/powerpoint/2010/main" val="2851772427"/>
+      </p:ext>
+    </p:extLst>
+  </p:cSld>
+  <p:clrMapOvr>
+    <a:masterClrMapping/>
+  </p:clrMapOvr>
+</p:sld>
+</file>
+
+<file path=ppt/slides/slide8.xml><?xml version="1.0" encoding="utf-8"?>
+<p:sld xmlns:a="http://schemas.openxmlformats.org/drawingml/2006/main" xmlns:r="http://schemas.openxmlformats.org/officeDocument/2006/relationships" xmlns:p="http://schemas.openxmlformats.org/presentationml/2006/main">
+  <p:cSld>
+    <p:spTree>
+      <p:nvGrpSpPr>
+        <p:cNvPr id="1" name=""/>
+        <p:cNvGrpSpPr/>
+        <p:nvPr/>
+      </p:nvGrpSpPr>
+      <p:grpSpPr>
+        <a:xfrm>
+          <a:off x="0" y="0"/>
+          <a:ext cx="0" cy="0"/>
+          <a:chOff x="0" y="0"/>
+          <a:chExt cx="0" cy="0"/>
+        </a:xfrm>
+      </p:grpSpPr>
+      <p:sp>
+        <p:nvSpPr>
+          <p:cNvPr id="2" name="Cím 1"/>
+          <p:cNvSpPr>
+            <a:spLocks noGrp="1"/>
+          </p:cNvSpPr>
+          <p:nvPr>
+            <p:ph type="title"/>
+          </p:nvPr>
+        </p:nvSpPr>
+        <p:spPr/>
+        <p:txBody>
+          <a:bodyPr/>
+          <a:lstStyle/>
+          <a:p>
+            <a:r>
+              <a:rPr lang="hu-HU" dirty="0" err="1" smtClean="0"/>
+              <a:t>Scrum</a:t>
+            </a:r>
+            <a:r>
+              <a:rPr lang="hu-HU" dirty="0" smtClean="0"/>
+              <a:t> munkaanyagok</a:t>
+            </a:r>
+            <a:endParaRPr lang="hu-HU" dirty="0"/>
+          </a:p>
+        </p:txBody>
+      </p:sp>
+      <p:sp>
+        <p:nvSpPr>
+          <p:cNvPr id="3" name="Tartalom helye 2"/>
+          <p:cNvSpPr>
+            <a:spLocks noGrp="1"/>
+          </p:cNvSpPr>
+          <p:nvPr>
+            <p:ph sz="half" idx="1"/>
+          </p:nvPr>
+        </p:nvSpPr>
+        <p:spPr/>
+        <p:txBody>
+          <a:bodyPr/>
+          <a:lstStyle/>
+          <a:p>
+            <a:endParaRPr lang="hu-HU"/>
+          </a:p>
+        </p:txBody>
+      </p:sp>
+      <p:sp>
+        <p:nvSpPr>
+          <p:cNvPr id="4" name="Tartalom helye 3"/>
+          <p:cNvSpPr>
+            <a:spLocks noGrp="1"/>
+          </p:cNvSpPr>
+          <p:nvPr>
+            <p:ph sz="half" idx="2"/>
+          </p:nvPr>
+        </p:nvSpPr>
+        <p:spPr/>
+        <p:txBody>
+          <a:bodyPr/>
+          <a:lstStyle/>
+          <a:p>
+            <a:endParaRPr lang="hu-HU"/>
+          </a:p>
+        </p:txBody>
+      </p:sp>
+    </p:spTree>
+    <p:extLst>
+      <p:ext uri="{BB962C8B-B14F-4D97-AF65-F5344CB8AC3E}">
+        <p14:creationId xmlns:p14="http://schemas.microsoft.com/office/powerpoint/2010/main" val="1078175993"/>
+      </p:ext>
+    </p:extLst>
+  </p:cSld>
+  <p:clrMapOvr>
+    <a:masterClrMapping/>
+  </p:clrMapOvr>
+</p:sld>
+</file>
+
+<file path=ppt/slides/slide9.xml><?xml version="1.0" encoding="utf-8"?>
+<p:sld xmlns:a="http://schemas.openxmlformats.org/drawingml/2006/main" xmlns:r="http://schemas.openxmlformats.org/officeDocument/2006/relationships" xmlns:p="http://schemas.openxmlformats.org/presentationml/2006/main">
+  <p:cSld>
+    <p:spTree>
+      <p:nvGrpSpPr>
+        <p:cNvPr id="1" name=""/>
+        <p:cNvGrpSpPr/>
+        <p:nvPr/>
+      </p:nvGrpSpPr>
+      <p:grpSpPr>
+        <a:xfrm>
+          <a:off x="0" y="0"/>
+          <a:ext cx="0" cy="0"/>
+          <a:chOff x="0" y="0"/>
+          <a:chExt cx="0" cy="0"/>
+        </a:xfrm>
+      </p:grpSpPr>
+      <p:sp>
+        <p:nvSpPr>
+          <p:cNvPr id="2" name="Cím 1"/>
+          <p:cNvSpPr>
+            <a:spLocks noGrp="1"/>
+          </p:cNvSpPr>
+          <p:nvPr>
+            <p:ph type="title"/>
+          </p:nvPr>
+        </p:nvSpPr>
+        <p:spPr/>
+        <p:txBody>
+          <a:bodyPr/>
+          <a:lstStyle/>
+          <a:p>
+            <a:r>
+              <a:rPr lang="hu-HU" dirty="0" smtClean="0"/>
+              <a:t>Források</a:t>
+            </a:r>
+            <a:endParaRPr lang="hu-HU" dirty="0"/>
+          </a:p>
+        </p:txBody>
+      </p:sp>
+      <p:sp>
+        <p:nvSpPr>
+          <p:cNvPr id="3" name="Tartalom helye 2"/>
+          <p:cNvSpPr>
+            <a:spLocks noGrp="1"/>
+          </p:cNvSpPr>
+          <p:nvPr>
+            <p:ph sz="half" idx="1"/>
+          </p:nvPr>
+        </p:nvSpPr>
+        <p:spPr/>
+        <p:txBody>
+          <a:bodyPr/>
+          <a:lstStyle/>
+          <a:p>
+            <a:endParaRPr lang="hu-HU"/>
+          </a:p>
+        </p:txBody>
+      </p:sp>
+      <p:sp>
+        <p:nvSpPr>
+          <p:cNvPr id="4" name="Tartalom helye 3"/>
+          <p:cNvSpPr>
+            <a:spLocks noGrp="1"/>
+          </p:cNvSpPr>
+          <p:nvPr>
+            <p:ph sz="half" idx="2"/>
+          </p:nvPr>
+        </p:nvSpPr>
+        <p:spPr/>
+        <p:txBody>
+          <a:bodyPr/>
+          <a:lstStyle/>
+          <a:p>
+            <a:endParaRPr lang="hu-HU"/>
+          </a:p>
+        </p:txBody>
+      </p:sp>
+    </p:spTree>
+    <p:extLst>
+      <p:ext uri="{BB962C8B-B14F-4D97-AF65-F5344CB8AC3E}">
+        <p14:creationId xmlns:p14="http://schemas.microsoft.com/office/powerpoint/2010/main" val="2890793772"/>
       </p:ext>
     </p:extLst>
   </p:cSld>

</xml_diff>